<commit_message>
Added outliers and conclusion slides
</commit_message>
<xml_diff>
--- a/Diabetes_Presentation.pptx
+++ b/Diabetes_Presentation.pptx
@@ -8,10 +8,13 @@
     <p:sldId id="256" r:id="rId2"/>
     <p:sldId id="257" r:id="rId3"/>
     <p:sldId id="258" r:id="rId4"/>
-    <p:sldId id="259" r:id="rId5"/>
-    <p:sldId id="261" r:id="rId6"/>
-    <p:sldId id="260" r:id="rId7"/>
-    <p:sldId id="262" r:id="rId8"/>
+    <p:sldId id="263" r:id="rId5"/>
+    <p:sldId id="264" r:id="rId6"/>
+    <p:sldId id="259" r:id="rId7"/>
+    <p:sldId id="260" r:id="rId8"/>
+    <p:sldId id="265" r:id="rId9"/>
+    <p:sldId id="261" r:id="rId10"/>
+    <p:sldId id="262" r:id="rId11"/>
   </p:sldIdLst>
   <p:sldSz cx="12192000" cy="6858000"/>
   <p:notesSz cx="6858000" cy="9144000"/>
@@ -110,6 +113,11 @@
       </a:defRPr>
     </a:lvl9pPr>
   </p:defaultTextStyle>
+  <p:extLst>
+    <p:ext uri="{EFAFB233-063F-42B5-8137-9DF3F51BA10A}">
+      <p15:sldGuideLst xmlns:p15="http://schemas.microsoft.com/office/powerpoint/2012/main"/>
+    </p:ext>
+  </p:extLst>
 </p:presentation>
 </file>
 
@@ -7642,7 +7650,12 @@
             <p:ph type="ctrTitle"/>
           </p:nvPr>
         </p:nvSpPr>
-        <p:spPr/>
+        <p:spPr>
+          <a:xfrm>
+            <a:off x="2589213" y="685799"/>
+            <a:ext cx="8915399" cy="2262781"/>
+          </a:xfrm>
+        </p:spPr>
         <p:txBody>
           <a:bodyPr/>
           <a:lstStyle/>
@@ -7670,25 +7683,135 @@
             <p:ph type="subTitle" idx="1"/>
           </p:nvPr>
         </p:nvSpPr>
+        <p:spPr>
+          <a:xfrm>
+            <a:off x="2589213" y="4297348"/>
+            <a:ext cx="8915399" cy="1126283"/>
+          </a:xfrm>
+        </p:spPr>
+        <p:txBody>
+          <a:bodyPr/>
+          <a:lstStyle/>
+          <a:p>
+            <a:r>
+              <a:rPr lang="en-CA" dirty="0"/>
+              <a:t>How can individual factors and bodily variables predict the progression of diabetes in pre-diagnosed patients?</a:t>
+            </a:r>
+          </a:p>
+          <a:p>
+            <a:endParaRPr lang="en-US" dirty="0"/>
+          </a:p>
+        </p:txBody>
+      </p:sp>
+    </p:spTree>
+    <p:extLst>
+      <p:ext uri="{BB962C8B-B14F-4D97-AF65-F5344CB8AC3E}">
+        <p14:creationId xmlns:p14="http://schemas.microsoft.com/office/powerpoint/2010/main" val="3454135343"/>
+      </p:ext>
+    </p:extLst>
+  </p:cSld>
+  <p:clrMapOvr>
+    <a:masterClrMapping/>
+  </p:clrMapOvr>
+</p:sld>
+</file>
+
+<file path=ppt/slides/slide10.xml><?xml version="1.0" encoding="utf-8"?>
+<p:sld xmlns:a="http://schemas.openxmlformats.org/drawingml/2006/main" xmlns:r="http://schemas.openxmlformats.org/officeDocument/2006/relationships" xmlns:p="http://schemas.openxmlformats.org/presentationml/2006/main">
+  <p:cSld>
+    <p:spTree>
+      <p:nvGrpSpPr>
+        <p:cNvPr id="1" name=""/>
+        <p:cNvGrpSpPr/>
+        <p:nvPr/>
+      </p:nvGrpSpPr>
+      <p:grpSpPr>
+        <a:xfrm>
+          <a:off x="0" y="0"/>
+          <a:ext cx="0" cy="0"/>
+          <a:chOff x="0" y="0"/>
+          <a:chExt cx="0" cy="0"/>
+        </a:xfrm>
+      </p:grpSpPr>
+      <p:sp>
+        <p:nvSpPr>
+          <p:cNvPr id="2" name="Title 1">
+            <a:extLst>
+              <a:ext uri="{FF2B5EF4-FFF2-40B4-BE49-F238E27FC236}">
+                <a16:creationId xmlns:a16="http://schemas.microsoft.com/office/drawing/2014/main" id="{B6F25128-E447-4940-8B93-4F7BDFDFEF8E}"/>
+              </a:ext>
+            </a:extLst>
+          </p:cNvPr>
+          <p:cNvSpPr>
+            <a:spLocks noGrp="1"/>
+          </p:cNvSpPr>
+          <p:nvPr>
+            <p:ph type="title"/>
+          </p:nvPr>
+        </p:nvSpPr>
         <p:spPr/>
         <p:txBody>
           <a:bodyPr/>
           <a:lstStyle/>
           <a:p>
             <a:r>
-              <a:rPr lang="en-CA" dirty="0"/>
-              <a:t>How can individual factors and bodily variables predict the progression of diabetes in pre-diagnosed patients?</a:t>
+              <a:rPr lang="en-US" dirty="0"/>
+              <a:t>Conclusion</a:t>
             </a:r>
           </a:p>
-          <a:p>
-            <a:endParaRPr lang="en-US" dirty="0"/>
+        </p:txBody>
+      </p:sp>
+      <p:sp>
+        <p:nvSpPr>
+          <p:cNvPr id="3" name="Content Placeholder 2">
+            <a:extLst>
+              <a:ext uri="{FF2B5EF4-FFF2-40B4-BE49-F238E27FC236}">
+                <a16:creationId xmlns:a16="http://schemas.microsoft.com/office/drawing/2014/main" id="{6F13F7C1-3EE5-D14A-843E-B74BD1D58183}"/>
+              </a:ext>
+            </a:extLst>
+          </p:cNvPr>
+          <p:cNvSpPr>
+            <a:spLocks noGrp="1"/>
+          </p:cNvSpPr>
+          <p:nvPr>
+            <p:ph idx="1"/>
+          </p:nvPr>
+        </p:nvSpPr>
+        <p:spPr/>
+        <p:txBody>
+          <a:bodyPr/>
+          <a:lstStyle/>
+          <a:p>
+            <a:r>
+              <a:rPr lang="en-US" dirty="0"/>
+              <a:t>Overall error for the model (at its best) was an RMSE of ~57</a:t>
+            </a:r>
+          </a:p>
+          <a:p>
+            <a:r>
+              <a:rPr lang="en-US" dirty="0"/>
+              <a:t>Lasso regression model used BP, BMI, and Tch</a:t>
+            </a:r>
+          </a:p>
+          <a:p>
+            <a:pPr lvl="1"/>
+            <a:r>
+              <a:rPr lang="en-US" dirty="0"/>
+              <a:t>Not as great error as the standard linear regression model, but avoids overfitting</a:t>
+            </a:r>
+          </a:p>
+          <a:p>
+            <a:r>
+              <a:rPr lang="en-US" dirty="0"/>
+              <a:t>After removal of outliers left only 430 observations -&gt; Need more data to have more powerful results</a:t>
+            </a:r>
           </a:p>
         </p:txBody>
       </p:sp>
     </p:spTree>
     <p:extLst>
       <p:ext uri="{BB962C8B-B14F-4D97-AF65-F5344CB8AC3E}">
-        <p14:creationId xmlns:p14="http://schemas.microsoft.com/office/powerpoint/2010/main" val="3454135343"/>
+        <p14:creationId xmlns:p14="http://schemas.microsoft.com/office/powerpoint/2010/main" val="3031079919"/>
       </p:ext>
     </p:extLst>
   </p:cSld>
@@ -7764,7 +7887,7 @@
           <p:nvPr>
             <p:extLst>
               <p:ext uri="{D42A27DB-BD31-4B8C-83A1-F6EECF244321}">
-                <p14:modId xmlns:p14="http://schemas.microsoft.com/office/powerpoint/2010/main" val="2418112985"/>
+                <p14:modId xmlns:p14="http://schemas.microsoft.com/office/powerpoint/2010/main" val="4000073779"/>
               </p:ext>
             </p:extLst>
           </p:nvPr>
@@ -7977,8 +8100,89 @@
                           <a:effectLst/>
                           <a:latin typeface="Calibri" panose="020F0502020204030204" pitchFamily="34" charset="0"/>
                         </a:rPr>
-                        <a:t>S1</a:t>
+                        <a:t>map</a:t>
                       </a:r>
+                    </a:p>
+                  </a:txBody>
+                  <a:tcPr marL="9525" marR="9525" marT="9525" marB="0" anchor="b"/>
+                </a:tc>
+                <a:tc>
+                  <a:txBody>
+                    <a:bodyPr/>
+                    <a:lstStyle/>
+                    <a:p>
+                      <a:pPr algn="ctr" fontAlgn="b"/>
+                      <a:r>
+                        <a:rPr lang="en-CA" sz="1800" b="0" i="0" u="none" strike="noStrike" dirty="0" err="1">
+                          <a:solidFill>
+                            <a:schemeClr val="bg1"/>
+                          </a:solidFill>
+                          <a:effectLst/>
+                          <a:latin typeface="Calibri" panose="020F0502020204030204" pitchFamily="34" charset="0"/>
+                        </a:rPr>
+                        <a:t>tc</a:t>
+                      </a:r>
+                      <a:endParaRPr lang="en-CA" sz="1800" b="0" i="0" u="none" strike="noStrike" dirty="0">
+                        <a:solidFill>
+                          <a:schemeClr val="bg1"/>
+                        </a:solidFill>
+                        <a:effectLst/>
+                        <a:latin typeface="Calibri" panose="020F0502020204030204" pitchFamily="34" charset="0"/>
+                      </a:endParaRPr>
+                    </a:p>
+                  </a:txBody>
+                  <a:tcPr marL="9525" marR="9525" marT="9525" marB="0" anchor="b"/>
+                </a:tc>
+                <a:tc>
+                  <a:txBody>
+                    <a:bodyPr/>
+                    <a:lstStyle/>
+                    <a:p>
+                      <a:pPr algn="ctr" fontAlgn="b"/>
+                      <a:r>
+                        <a:rPr lang="en-CA" sz="1800" b="0" i="0" u="none" strike="noStrike" dirty="0" err="1">
+                          <a:solidFill>
+                            <a:schemeClr val="bg1"/>
+                          </a:solidFill>
+                          <a:effectLst/>
+                          <a:latin typeface="Calibri" panose="020F0502020204030204" pitchFamily="34" charset="0"/>
+                        </a:rPr>
+                        <a:t>ldl</a:t>
+                      </a:r>
+                      <a:endParaRPr lang="en-CA" sz="1800" b="0" i="0" u="none" strike="noStrike" dirty="0">
+                        <a:solidFill>
+                          <a:schemeClr val="bg1"/>
+                        </a:solidFill>
+                        <a:effectLst/>
+                        <a:latin typeface="Calibri" panose="020F0502020204030204" pitchFamily="34" charset="0"/>
+                      </a:endParaRPr>
+                    </a:p>
+                  </a:txBody>
+                  <a:tcPr marL="9525" marR="9525" marT="9525" marB="0" anchor="b"/>
+                </a:tc>
+                <a:tc>
+                  <a:txBody>
+                    <a:bodyPr/>
+                    <a:lstStyle/>
+                    <a:p>
+                      <a:pPr algn="ctr" fontAlgn="b"/>
+                      <a:r>
+                        <a:rPr lang="en-CA" sz="1800" b="0" i="0" u="none" strike="noStrike" dirty="0" err="1">
+                          <a:solidFill>
+                            <a:schemeClr val="bg1"/>
+                          </a:solidFill>
+                          <a:effectLst/>
+                          <a:latin typeface="Calibri" panose="020F0502020204030204" pitchFamily="34" charset="0"/>
+                        </a:rPr>
+                        <a:t>hdl</a:t>
+                      </a:r>
+                      <a:endParaRPr lang="en-CA" sz="1800" b="0" i="0" u="none" strike="noStrike" dirty="0">
+                        <a:solidFill>
+                          <a:schemeClr val="bg1"/>
+                        </a:solidFill>
+                        <a:effectLst/>
+                        <a:latin typeface="Calibri" panose="020F0502020204030204" pitchFamily="34" charset="0"/>
+                      </a:endParaRPr>
                     </a:p>
                   </a:txBody>
                   <a:tcPr marL="9525" marR="9525" marT="9525" marB="0" anchor="b"/>
@@ -7997,7 +8201,7 @@
                           <a:effectLst/>
                           <a:latin typeface="Calibri" panose="020F0502020204030204" pitchFamily="34" charset="0"/>
                         </a:rPr>
-                        <a:t>S2</a:t>
+                        <a:t>Tch</a:t>
                       </a:r>
                     </a:p>
                   </a:txBody>
@@ -8010,75 +8214,22 @@
                     <a:p>
                       <a:pPr algn="ctr" fontAlgn="b"/>
                       <a:r>
-                        <a:rPr lang="en-CA" sz="1800" b="0" i="0" u="none" strike="noStrike" dirty="0">
+                        <a:rPr lang="en-CA" sz="1800" b="0" i="0" u="none" strike="noStrike" dirty="0" err="1">
                           <a:solidFill>
                             <a:schemeClr val="bg1"/>
                           </a:solidFill>
                           <a:effectLst/>
                           <a:latin typeface="Calibri" panose="020F0502020204030204" pitchFamily="34" charset="0"/>
                         </a:rPr>
-                        <a:t>S3</a:t>
+                        <a:t>glu</a:t>
                       </a:r>
-                    </a:p>
-                  </a:txBody>
-                  <a:tcPr marL="9525" marR="9525" marT="9525" marB="0" anchor="b"/>
-                </a:tc>
-                <a:tc>
-                  <a:txBody>
-                    <a:bodyPr/>
-                    <a:lstStyle/>
-                    <a:p>
-                      <a:pPr algn="ctr" fontAlgn="b"/>
-                      <a:r>
-                        <a:rPr lang="en-CA" sz="1800" b="0" i="0" u="none" strike="noStrike" dirty="0">
-                          <a:solidFill>
-                            <a:schemeClr val="bg1"/>
-                          </a:solidFill>
-                          <a:effectLst/>
-                          <a:latin typeface="Calibri" panose="020F0502020204030204" pitchFamily="34" charset="0"/>
-                        </a:rPr>
-                        <a:t>S4</a:t>
-                      </a:r>
-                    </a:p>
-                  </a:txBody>
-                  <a:tcPr marL="9525" marR="9525" marT="9525" marB="0" anchor="b"/>
-                </a:tc>
-                <a:tc>
-                  <a:txBody>
-                    <a:bodyPr/>
-                    <a:lstStyle/>
-                    <a:p>
-                      <a:pPr algn="ctr" fontAlgn="b"/>
-                      <a:r>
-                        <a:rPr lang="en-CA" sz="1800" b="0" i="0" u="none" strike="noStrike" dirty="0">
-                          <a:solidFill>
-                            <a:schemeClr val="bg1"/>
-                          </a:solidFill>
-                          <a:effectLst/>
-                          <a:latin typeface="Calibri" panose="020F0502020204030204" pitchFamily="34" charset="0"/>
-                        </a:rPr>
-                        <a:t>S5</a:t>
-                      </a:r>
-                    </a:p>
-                  </a:txBody>
-                  <a:tcPr marL="9525" marR="9525" marT="9525" marB="0" anchor="b"/>
-                </a:tc>
-                <a:tc>
-                  <a:txBody>
-                    <a:bodyPr/>
-                    <a:lstStyle/>
-                    <a:p>
-                      <a:pPr algn="ctr" fontAlgn="b"/>
-                      <a:r>
-                        <a:rPr lang="en-CA" sz="1800" b="0" i="0" u="none" strike="noStrike">
-                          <a:solidFill>
-                            <a:schemeClr val="bg1"/>
-                          </a:solidFill>
-                          <a:effectLst/>
-                          <a:latin typeface="Calibri" panose="020F0502020204030204" pitchFamily="34" charset="0"/>
-                        </a:rPr>
-                        <a:t>S6</a:t>
-                      </a:r>
+                      <a:endParaRPr lang="en-CA" sz="1800" b="0" i="0" u="none" strike="noStrike" dirty="0">
+                        <a:solidFill>
+                          <a:schemeClr val="bg1"/>
+                        </a:solidFill>
+                        <a:effectLst/>
+                        <a:latin typeface="Calibri" panose="020F0502020204030204" pitchFamily="34" charset="0"/>
+                      </a:endParaRPr>
                     </a:p>
                   </a:txBody>
                   <a:tcPr marL="9525" marR="9525" marT="9525" marB="0" anchor="b"/>
@@ -10206,21 +10357,239 @@
           <a:chExt cx="0" cy="0"/>
         </a:xfrm>
       </p:grpSpPr>
+      <p:sp>
+        <p:nvSpPr>
+          <p:cNvPr id="2" name="Title 1">
+            <a:extLst>
+              <a:ext uri="{FF2B5EF4-FFF2-40B4-BE49-F238E27FC236}">
+                <a16:creationId xmlns:a16="http://schemas.microsoft.com/office/drawing/2014/main" id="{9D8118FA-04A0-EC45-8892-97330A086807}"/>
+              </a:ext>
+            </a:extLst>
+          </p:cNvPr>
+          <p:cNvSpPr>
+            <a:spLocks noGrp="1"/>
+          </p:cNvSpPr>
+          <p:nvPr>
+            <p:ph type="title"/>
+          </p:nvPr>
+        </p:nvSpPr>
+        <p:spPr>
+          <a:xfrm>
+            <a:off x="3775267" y="624109"/>
+            <a:ext cx="4641465" cy="581235"/>
+          </a:xfrm>
+        </p:spPr>
+        <p:txBody>
+          <a:bodyPr>
+            <a:normAutofit fontScale="90000"/>
+          </a:bodyPr>
+          <a:lstStyle/>
+          <a:p>
+            <a:r>
+              <a:rPr lang="en-US" dirty="0"/>
+              <a:t>Removal of Outliers</a:t>
+            </a:r>
+          </a:p>
+        </p:txBody>
+      </p:sp>
+      <p:sp>
+        <p:nvSpPr>
+          <p:cNvPr id="3" name="Content Placeholder 2">
+            <a:extLst>
+              <a:ext uri="{FF2B5EF4-FFF2-40B4-BE49-F238E27FC236}">
+                <a16:creationId xmlns:a16="http://schemas.microsoft.com/office/drawing/2014/main" id="{BC70E873-17BA-3B4B-93B2-7111D624271A}"/>
+              </a:ext>
+            </a:extLst>
+          </p:cNvPr>
+          <p:cNvSpPr>
+            <a:spLocks noGrp="1"/>
+          </p:cNvSpPr>
+          <p:nvPr>
+            <p:ph idx="1"/>
+          </p:nvPr>
+        </p:nvSpPr>
+        <p:spPr>
+          <a:xfrm>
+            <a:off x="3421290" y="4973761"/>
+            <a:ext cx="5459474" cy="1122239"/>
+          </a:xfrm>
+          <a:solidFill>
+            <a:schemeClr val="tx1"/>
+          </a:solidFill>
+        </p:spPr>
+        <p:style>
+          <a:lnRef idx="2">
+            <a:schemeClr val="dk1"/>
+          </a:lnRef>
+          <a:fillRef idx="1">
+            <a:schemeClr val="lt1"/>
+          </a:fillRef>
+          <a:effectRef idx="0">
+            <a:schemeClr val="dk1"/>
+          </a:effectRef>
+          <a:fontRef idx="minor">
+            <a:schemeClr val="dk1"/>
+          </a:fontRef>
+        </p:style>
+        <p:txBody>
+          <a:bodyPr>
+            <a:normAutofit fontScale="85000" lnSpcReduction="20000"/>
+          </a:bodyPr>
+          <a:lstStyle/>
+          <a:p>
+            <a:pPr marL="0" indent="0">
+              <a:buNone/>
+            </a:pPr>
+            <a:r>
+              <a:rPr lang="en-CA" dirty="0">
+                <a:solidFill>
+                  <a:schemeClr val="bg1"/>
+                </a:solidFill>
+              </a:rPr>
+              <a:t>from </a:t>
+            </a:r>
+            <a:r>
+              <a:rPr lang="en-CA" dirty="0" err="1">
+                <a:solidFill>
+                  <a:schemeClr val="bg1"/>
+                </a:solidFill>
+              </a:rPr>
+              <a:t>scipy</a:t>
+            </a:r>
+            <a:r>
+              <a:rPr lang="en-CA" dirty="0">
+                <a:solidFill>
+                  <a:schemeClr val="bg1"/>
+                </a:solidFill>
+              </a:rPr>
+              <a:t> import stats</a:t>
+            </a:r>
+          </a:p>
+          <a:p>
+            <a:pPr marL="0" indent="0">
+              <a:buNone/>
+            </a:pPr>
+            <a:r>
+              <a:rPr lang="en-CA" dirty="0">
+                <a:solidFill>
+                  <a:schemeClr val="bg1"/>
+                </a:solidFill>
+              </a:rPr>
+              <a:t>z = </a:t>
+            </a:r>
+            <a:r>
+              <a:rPr lang="en-CA" dirty="0" err="1">
+                <a:solidFill>
+                  <a:schemeClr val="bg1"/>
+                </a:solidFill>
+              </a:rPr>
+              <a:t>np.abs</a:t>
+            </a:r>
+            <a:r>
+              <a:rPr lang="en-CA" dirty="0">
+                <a:solidFill>
+                  <a:schemeClr val="bg1"/>
+                </a:solidFill>
+              </a:rPr>
+              <a:t>(</a:t>
+            </a:r>
+            <a:r>
+              <a:rPr lang="en-CA" dirty="0" err="1">
+                <a:solidFill>
+                  <a:schemeClr val="bg1"/>
+                </a:solidFill>
+              </a:rPr>
+              <a:t>stats.zscore</a:t>
+            </a:r>
+            <a:r>
+              <a:rPr lang="en-CA" dirty="0">
+                <a:solidFill>
+                  <a:schemeClr val="bg1"/>
+                </a:solidFill>
+              </a:rPr>
+              <a:t>(</a:t>
+            </a:r>
+            <a:r>
+              <a:rPr lang="en-CA" dirty="0" err="1">
+                <a:solidFill>
+                  <a:schemeClr val="bg1"/>
+                </a:solidFill>
+              </a:rPr>
+              <a:t>diabetes_df</a:t>
+            </a:r>
+            <a:r>
+              <a:rPr lang="en-CA" dirty="0">
+                <a:solidFill>
+                  <a:schemeClr val="bg1"/>
+                </a:solidFill>
+              </a:rPr>
+              <a:t>))</a:t>
+            </a:r>
+          </a:p>
+          <a:p>
+            <a:pPr marL="0" indent="0">
+              <a:buNone/>
+            </a:pPr>
+            <a:br>
+              <a:rPr lang="en-CA" dirty="0">
+                <a:solidFill>
+                  <a:schemeClr val="bg1"/>
+                </a:solidFill>
+              </a:rPr>
+            </a:br>
+            <a:r>
+              <a:rPr lang="en-CA" dirty="0" err="1">
+                <a:solidFill>
+                  <a:schemeClr val="bg1"/>
+                </a:solidFill>
+              </a:rPr>
+              <a:t>diabetes_df_o</a:t>
+            </a:r>
+            <a:r>
+              <a:rPr lang="en-CA" dirty="0">
+                <a:solidFill>
+                  <a:schemeClr val="bg1"/>
+                </a:solidFill>
+              </a:rPr>
+              <a:t> = </a:t>
+            </a:r>
+            <a:r>
+              <a:rPr lang="en-CA" dirty="0" err="1">
+                <a:solidFill>
+                  <a:schemeClr val="bg1"/>
+                </a:solidFill>
+              </a:rPr>
+              <a:t>diabetes_df</a:t>
+            </a:r>
+            <a:r>
+              <a:rPr lang="en-CA" dirty="0">
+                <a:solidFill>
+                  <a:schemeClr val="bg1"/>
+                </a:solidFill>
+              </a:rPr>
+              <a:t>[(z &lt; 3).all(axis=1)]</a:t>
+            </a:r>
+            <a:endParaRPr lang="en-US" dirty="0">
+              <a:solidFill>
+                <a:schemeClr val="bg1"/>
+              </a:solidFill>
+            </a:endParaRPr>
+          </a:p>
+        </p:txBody>
+      </p:sp>
       <p:pic>
         <p:nvPicPr>
-          <p:cNvPr id="5" name="Content Placeholder 4">
+          <p:cNvPr id="6" name="Picture 5">
             <a:extLst>
               <a:ext uri="{FF2B5EF4-FFF2-40B4-BE49-F238E27FC236}">
-                <a16:creationId xmlns:a16="http://schemas.microsoft.com/office/drawing/2014/main" id="{7C00B78A-47C0-B349-B338-077DAA7BE20D}"/>
+                <a16:creationId xmlns:a16="http://schemas.microsoft.com/office/drawing/2014/main" id="{428B9DE2-D378-6B47-9837-9D08740AF470}"/>
               </a:ext>
             </a:extLst>
           </p:cNvPr>
           <p:cNvPicPr>
-            <a:picLocks noGrp="1" noChangeAspect="1"/>
+            <a:picLocks noChangeAspect="1"/>
           </p:cNvPicPr>
-          <p:nvPr>
-            <p:ph idx="1"/>
-          </p:nvPr>
+          <p:nvPr/>
         </p:nvPicPr>
         <p:blipFill>
           <a:blip r:embed="rId2"/>
@@ -10230,15 +10599,18 @@
         </p:blipFill>
         <p:spPr>
           <a:xfrm>
-            <a:off x="2170545" y="263236"/>
-            <a:ext cx="9709193" cy="6331527"/>
+            <a:off x="3775267" y="2135082"/>
+            <a:ext cx="4641465" cy="2431950"/>
           </a:xfrm>
+          <a:prstGeom prst="rect">
+            <a:avLst/>
+          </a:prstGeom>
         </p:spPr>
       </p:pic>
     </p:spTree>
     <p:extLst>
       <p:ext uri="{BB962C8B-B14F-4D97-AF65-F5344CB8AC3E}">
-        <p14:creationId xmlns:p14="http://schemas.microsoft.com/office/powerpoint/2010/main" val="1847636399"/>
+        <p14:creationId xmlns:p14="http://schemas.microsoft.com/office/powerpoint/2010/main" val="1202077663"/>
       </p:ext>
     </p:extLst>
   </p:cSld>
@@ -10270,7 +10642,7 @@
           <p:cNvPr id="2" name="Title 1">
             <a:extLst>
               <a:ext uri="{FF2B5EF4-FFF2-40B4-BE49-F238E27FC236}">
-                <a16:creationId xmlns:a16="http://schemas.microsoft.com/office/drawing/2014/main" id="{039C5F45-472E-C448-8C0F-2C6F8AF9033A}"/>
+                <a16:creationId xmlns:a16="http://schemas.microsoft.com/office/drawing/2014/main" id="{38EA2DC8-BD1A-E643-BD9A-B577F5D4D8AD}"/>
               </a:ext>
             </a:extLst>
           </p:cNvPr>
@@ -10281,14 +10653,19 @@
             <p:ph type="title"/>
           </p:nvPr>
         </p:nvSpPr>
-        <p:spPr/>
+        <p:spPr>
+          <a:xfrm>
+            <a:off x="845220" y="1369176"/>
+            <a:ext cx="3574381" cy="1280890"/>
+          </a:xfrm>
+        </p:spPr>
         <p:txBody>
           <a:bodyPr/>
           <a:lstStyle/>
           <a:p>
             <a:r>
               <a:rPr lang="en-US" dirty="0"/>
-              <a:t>Results</a:t>
+              <a:t>Deciding on Analysis</a:t>
             </a:r>
           </a:p>
         </p:txBody>
@@ -10298,7 +10675,7 @@
           <p:cNvPr id="5" name="Content Placeholder 4">
             <a:extLst>
               <a:ext uri="{FF2B5EF4-FFF2-40B4-BE49-F238E27FC236}">
-                <a16:creationId xmlns:a16="http://schemas.microsoft.com/office/drawing/2014/main" id="{CF723EDE-D8A3-7741-AFE8-87B7F7632BF3}"/>
+                <a16:creationId xmlns:a16="http://schemas.microsoft.com/office/drawing/2014/main" id="{A2B3C526-5CD2-6448-B4F4-9D5E4221FEBC}"/>
               </a:ext>
             </a:extLst>
           </p:cNvPr>
@@ -10317,15 +10694,15 @@
         </p:blipFill>
         <p:spPr>
           <a:xfrm>
-            <a:off x="4528080" y="2133600"/>
-            <a:ext cx="5037666" cy="3778250"/>
+            <a:off x="4792133" y="156629"/>
+            <a:ext cx="7027333" cy="6544741"/>
           </a:xfrm>
         </p:spPr>
       </p:pic>
     </p:spTree>
     <p:extLst>
       <p:ext uri="{BB962C8B-B14F-4D97-AF65-F5344CB8AC3E}">
-        <p14:creationId xmlns:p14="http://schemas.microsoft.com/office/powerpoint/2010/main" val="503465112"/>
+        <p14:creationId xmlns:p14="http://schemas.microsoft.com/office/powerpoint/2010/main" val="3866771919"/>
       </p:ext>
     </p:extLst>
   </p:cSld>
@@ -10352,37 +10729,12 @@
           <a:chExt cx="0" cy="0"/>
         </a:xfrm>
       </p:grpSpPr>
-      <p:sp>
-        <p:nvSpPr>
-          <p:cNvPr id="2" name="Title 1">
-            <a:extLst>
-              <a:ext uri="{FF2B5EF4-FFF2-40B4-BE49-F238E27FC236}">
-                <a16:creationId xmlns:a16="http://schemas.microsoft.com/office/drawing/2014/main" id="{7EE2A3AE-9FA0-EC4E-9416-F4EEB036EAE0}"/>
-              </a:ext>
-            </a:extLst>
-          </p:cNvPr>
-          <p:cNvSpPr>
-            <a:spLocks noGrp="1"/>
-          </p:cNvSpPr>
-          <p:nvPr>
-            <p:ph type="title"/>
-          </p:nvPr>
-        </p:nvSpPr>
-        <p:spPr/>
-        <p:txBody>
-          <a:bodyPr/>
-          <a:lstStyle/>
-          <a:p>
-            <a:endParaRPr lang="en-US" dirty="0"/>
-          </a:p>
-        </p:txBody>
-      </p:sp>
       <p:pic>
         <p:nvPicPr>
           <p:cNvPr id="5" name="Content Placeholder 4">
             <a:extLst>
               <a:ext uri="{FF2B5EF4-FFF2-40B4-BE49-F238E27FC236}">
-                <a16:creationId xmlns:a16="http://schemas.microsoft.com/office/drawing/2014/main" id="{5DC1886D-0927-8B4F-A535-42DC2098A3AD}"/>
+                <a16:creationId xmlns:a16="http://schemas.microsoft.com/office/drawing/2014/main" id="{7C00B78A-47C0-B349-B338-077DAA7BE20D}"/>
               </a:ext>
             </a:extLst>
           </p:cNvPr>
@@ -10401,15 +10753,65 @@
         </p:blipFill>
         <p:spPr>
           <a:xfrm>
-            <a:off x="4267200" y="1905000"/>
-            <a:ext cx="4530293" cy="4530293"/>
+            <a:off x="2239817" y="166254"/>
+            <a:ext cx="9709193" cy="6331527"/>
           </a:xfrm>
         </p:spPr>
       </p:pic>
+      <p:sp>
+        <p:nvSpPr>
+          <p:cNvPr id="2" name="Rectangle 1">
+            <a:extLst>
+              <a:ext uri="{FF2B5EF4-FFF2-40B4-BE49-F238E27FC236}">
+                <a16:creationId xmlns:a16="http://schemas.microsoft.com/office/drawing/2014/main" id="{9D73462E-4C2F-6A44-A259-2E7F91E35236}"/>
+              </a:ext>
+            </a:extLst>
+          </p:cNvPr>
+          <p:cNvSpPr/>
+          <p:nvPr/>
+        </p:nvSpPr>
+        <p:spPr>
+          <a:xfrm>
+            <a:off x="2773334" y="5304751"/>
+            <a:ext cx="6891867" cy="508000"/>
+          </a:xfrm>
+          <a:prstGeom prst="rect">
+            <a:avLst/>
+          </a:prstGeom>
+          <a:noFill/>
+          <a:ln w="57150">
+            <a:solidFill>
+              <a:srgbClr val="C00000"/>
+            </a:solidFill>
+          </a:ln>
+        </p:spPr>
+        <p:style>
+          <a:lnRef idx="2">
+            <a:schemeClr val="accent6"/>
+          </a:lnRef>
+          <a:fillRef idx="1">
+            <a:schemeClr val="lt1"/>
+          </a:fillRef>
+          <a:effectRef idx="0">
+            <a:schemeClr val="accent6"/>
+          </a:effectRef>
+          <a:fontRef idx="minor">
+            <a:schemeClr val="dk1"/>
+          </a:fontRef>
+        </p:style>
+        <p:txBody>
+          <a:bodyPr rtlCol="0" anchor="ctr"/>
+          <a:lstStyle/>
+          <a:p>
+            <a:pPr algn="ctr"/>
+            <a:endParaRPr lang="en-US"/>
+          </a:p>
+        </p:txBody>
+      </p:sp>
     </p:spTree>
     <p:extLst>
       <p:ext uri="{BB962C8B-B14F-4D97-AF65-F5344CB8AC3E}">
-        <p14:creationId xmlns:p14="http://schemas.microsoft.com/office/powerpoint/2010/main" val="4001837896"/>
+        <p14:creationId xmlns:p14="http://schemas.microsoft.com/office/powerpoint/2010/main" val="1847636399"/>
       </p:ext>
     </p:extLst>
   </p:cSld>
@@ -10436,12 +10838,71 @@
           <a:chExt cx="0" cy="0"/>
         </a:xfrm>
       </p:grpSpPr>
+      <p:pic>
+        <p:nvPicPr>
+          <p:cNvPr id="5" name="Content Placeholder 4">
+            <a:extLst>
+              <a:ext uri="{FF2B5EF4-FFF2-40B4-BE49-F238E27FC236}">
+                <a16:creationId xmlns:a16="http://schemas.microsoft.com/office/drawing/2014/main" id="{5DC1886D-0927-8B4F-A535-42DC2098A3AD}"/>
+              </a:ext>
+            </a:extLst>
+          </p:cNvPr>
+          <p:cNvPicPr>
+            <a:picLocks noGrp="1" noChangeAspect="1"/>
+          </p:cNvPicPr>
+          <p:nvPr>
+            <p:ph idx="1"/>
+          </p:nvPr>
+        </p:nvPicPr>
+        <p:blipFill>
+          <a:blip r:embed="rId2"/>
+          <a:stretch>
+            <a:fillRect/>
+          </a:stretch>
+        </p:blipFill>
+        <p:spPr>
+          <a:xfrm>
+            <a:off x="3685310" y="325583"/>
+            <a:ext cx="6331526" cy="6331526"/>
+          </a:xfrm>
+        </p:spPr>
+      </p:pic>
+    </p:spTree>
+    <p:extLst>
+      <p:ext uri="{BB962C8B-B14F-4D97-AF65-F5344CB8AC3E}">
+        <p14:creationId xmlns:p14="http://schemas.microsoft.com/office/powerpoint/2010/main" val="4001837896"/>
+      </p:ext>
+    </p:extLst>
+  </p:cSld>
+  <p:clrMapOvr>
+    <a:masterClrMapping/>
+  </p:clrMapOvr>
+</p:sld>
+</file>
+
+<file path=ppt/slides/slide8.xml><?xml version="1.0" encoding="utf-8"?>
+<p:sld xmlns:a="http://schemas.openxmlformats.org/drawingml/2006/main" xmlns:r="http://schemas.openxmlformats.org/officeDocument/2006/relationships" xmlns:p="http://schemas.openxmlformats.org/presentationml/2006/main">
+  <p:cSld>
+    <p:spTree>
+      <p:nvGrpSpPr>
+        <p:cNvPr id="1" name=""/>
+        <p:cNvGrpSpPr/>
+        <p:nvPr/>
+      </p:nvGrpSpPr>
+      <p:grpSpPr>
+        <a:xfrm>
+          <a:off x="0" y="0"/>
+          <a:ext cx="0" cy="0"/>
+          <a:chOff x="0" y="0"/>
+          <a:chExt cx="0" cy="0"/>
+        </a:xfrm>
+      </p:grpSpPr>
       <p:sp>
         <p:nvSpPr>
           <p:cNvPr id="2" name="Title 1">
             <a:extLst>
               <a:ext uri="{FF2B5EF4-FFF2-40B4-BE49-F238E27FC236}">
-                <a16:creationId xmlns:a16="http://schemas.microsoft.com/office/drawing/2014/main" id="{B6F25128-E447-4940-8B93-4F7BDFDFEF8E}"/>
+                <a16:creationId xmlns:a16="http://schemas.microsoft.com/office/drawing/2014/main" id="{DD32BDA7-1B9B-1F4A-9F1A-4F8DAA8547EA}"/>
               </a:ext>
             </a:extLst>
           </p:cNvPr>
@@ -10457,7 +10918,10 @@
           <a:bodyPr/>
           <a:lstStyle/>
           <a:p>
-            <a:endParaRPr lang="en-US"/>
+            <a:r>
+              <a:rPr lang="en-US" dirty="0"/>
+              <a:t>Lasso Regression Analysis</a:t>
+            </a:r>
           </a:p>
         </p:txBody>
       </p:sp>
@@ -10466,7 +10930,7 @@
           <p:cNvPr id="3" name="Content Placeholder 2">
             <a:extLst>
               <a:ext uri="{FF2B5EF4-FFF2-40B4-BE49-F238E27FC236}">
-                <a16:creationId xmlns:a16="http://schemas.microsoft.com/office/drawing/2014/main" id="{6F13F7C1-3EE5-D14A-843E-B74BD1D58183}"/>
+                <a16:creationId xmlns:a16="http://schemas.microsoft.com/office/drawing/2014/main" id="{BB0F8ABD-3AD9-0746-B105-7F9CC3EF3C7E}"/>
               </a:ext>
             </a:extLst>
           </p:cNvPr>
@@ -10489,7 +10953,94 @@
     </p:spTree>
     <p:extLst>
       <p:ext uri="{BB962C8B-B14F-4D97-AF65-F5344CB8AC3E}">
-        <p14:creationId xmlns:p14="http://schemas.microsoft.com/office/powerpoint/2010/main" val="3031079919"/>
+        <p14:creationId xmlns:p14="http://schemas.microsoft.com/office/powerpoint/2010/main" val="2669521511"/>
+      </p:ext>
+    </p:extLst>
+  </p:cSld>
+  <p:clrMapOvr>
+    <a:masterClrMapping/>
+  </p:clrMapOvr>
+</p:sld>
+</file>
+
+<file path=ppt/slides/slide9.xml><?xml version="1.0" encoding="utf-8"?>
+<p:sld xmlns:a="http://schemas.openxmlformats.org/drawingml/2006/main" xmlns:r="http://schemas.openxmlformats.org/officeDocument/2006/relationships" xmlns:p="http://schemas.openxmlformats.org/presentationml/2006/main">
+  <p:cSld>
+    <p:spTree>
+      <p:nvGrpSpPr>
+        <p:cNvPr id="1" name=""/>
+        <p:cNvGrpSpPr/>
+        <p:nvPr/>
+      </p:nvGrpSpPr>
+      <p:grpSpPr>
+        <a:xfrm>
+          <a:off x="0" y="0"/>
+          <a:ext cx="0" cy="0"/>
+          <a:chOff x="0" y="0"/>
+          <a:chExt cx="0" cy="0"/>
+        </a:xfrm>
+      </p:grpSpPr>
+      <p:sp>
+        <p:nvSpPr>
+          <p:cNvPr id="2" name="Title 1">
+            <a:extLst>
+              <a:ext uri="{FF2B5EF4-FFF2-40B4-BE49-F238E27FC236}">
+                <a16:creationId xmlns:a16="http://schemas.microsoft.com/office/drawing/2014/main" id="{039C5F45-472E-C448-8C0F-2C6F8AF9033A}"/>
+              </a:ext>
+            </a:extLst>
+          </p:cNvPr>
+          <p:cNvSpPr>
+            <a:spLocks noGrp="1"/>
+          </p:cNvSpPr>
+          <p:nvPr>
+            <p:ph type="title"/>
+          </p:nvPr>
+        </p:nvSpPr>
+        <p:spPr/>
+        <p:txBody>
+          <a:bodyPr/>
+          <a:lstStyle/>
+          <a:p>
+            <a:r>
+              <a:rPr lang="en-US" dirty="0"/>
+              <a:t>Results</a:t>
+            </a:r>
+          </a:p>
+        </p:txBody>
+      </p:sp>
+      <p:pic>
+        <p:nvPicPr>
+          <p:cNvPr id="5" name="Content Placeholder 4">
+            <a:extLst>
+              <a:ext uri="{FF2B5EF4-FFF2-40B4-BE49-F238E27FC236}">
+                <a16:creationId xmlns:a16="http://schemas.microsoft.com/office/drawing/2014/main" id="{CF723EDE-D8A3-7741-AFE8-87B7F7632BF3}"/>
+              </a:ext>
+            </a:extLst>
+          </p:cNvPr>
+          <p:cNvPicPr>
+            <a:picLocks noGrp="1" noChangeAspect="1"/>
+          </p:cNvPicPr>
+          <p:nvPr>
+            <p:ph idx="1"/>
+          </p:nvPr>
+        </p:nvPicPr>
+        <p:blipFill>
+          <a:blip r:embed="rId2"/>
+          <a:stretch>
+            <a:fillRect/>
+          </a:stretch>
+        </p:blipFill>
+        <p:spPr>
+          <a:xfrm>
+            <a:off x="5541818" y="1264555"/>
+            <a:ext cx="6088255" cy="4566192"/>
+          </a:xfrm>
+        </p:spPr>
+      </p:pic>
+    </p:spTree>
+    <p:extLst>
+      <p:ext uri="{BB962C8B-B14F-4D97-AF65-F5344CB8AC3E}">
+        <p14:creationId xmlns:p14="http://schemas.microsoft.com/office/powerpoint/2010/main" val="503465112"/>
       </p:ext>
     </p:extLst>
   </p:cSld>

</xml_diff>

<commit_message>
Added information on lasso
</commit_message>
<xml_diff>
--- a/Diabetes_Presentation.pptx
+++ b/Diabetes_Presentation.pptx
@@ -310,7 +310,7 @@
             <a:fld id="{B61BEF0D-F0BB-DE4B-95CE-6DB70DBA9567}" type="datetimeFigureOut">
               <a:rPr lang="en-US" dirty="0"/>
               <a:pPr/>
-              <a:t>6/13/19</a:t>
+              <a:t>6/14/19</a:t>
             </a:fld>
             <a:endParaRPr lang="en-US" dirty="0"/>
           </a:p>
@@ -645,7 +645,7 @@
             <a:fld id="{B61BEF0D-F0BB-DE4B-95CE-6DB70DBA9567}" type="datetimeFigureOut">
               <a:rPr lang="en-US" dirty="0"/>
               <a:pPr/>
-              <a:t>6/13/19</a:t>
+              <a:t>6/14/19</a:t>
             </a:fld>
             <a:endParaRPr lang="en-US" dirty="0"/>
           </a:p>
@@ -1043,7 +1043,7 @@
             <a:fld id="{B61BEF0D-F0BB-DE4B-95CE-6DB70DBA9567}" type="datetimeFigureOut">
               <a:rPr lang="en-US" dirty="0"/>
               <a:pPr/>
-              <a:t>6/13/19</a:t>
+              <a:t>6/14/19</a:t>
             </a:fld>
             <a:endParaRPr lang="en-US" dirty="0"/>
           </a:p>
@@ -1376,7 +1376,7 @@
             <a:fld id="{B61BEF0D-F0BB-DE4B-95CE-6DB70DBA9567}" type="datetimeFigureOut">
               <a:rPr lang="en-US" dirty="0"/>
               <a:pPr/>
-              <a:t>6/13/19</a:t>
+              <a:t>6/14/19</a:t>
             </a:fld>
             <a:endParaRPr lang="en-US" dirty="0"/>
           </a:p>
@@ -1693,7 +1693,7 @@
             <a:fld id="{B61BEF0D-F0BB-DE4B-95CE-6DB70DBA9567}" type="datetimeFigureOut">
               <a:rPr lang="en-US" dirty="0"/>
               <a:pPr/>
-              <a:t>6/13/19</a:t>
+              <a:t>6/14/19</a:t>
             </a:fld>
             <a:endParaRPr lang="en-US" dirty="0"/>
           </a:p>
@@ -2086,7 +2086,7 @@
             <a:fld id="{B61BEF0D-F0BB-DE4B-95CE-6DB70DBA9567}" type="datetimeFigureOut">
               <a:rPr lang="en-US" dirty="0"/>
               <a:pPr/>
-              <a:t>6/13/19</a:t>
+              <a:t>6/14/19</a:t>
             </a:fld>
             <a:endParaRPr lang="en-US" dirty="0"/>
           </a:p>
@@ -2340,7 +2340,7 @@
             <a:fld id="{B61BEF0D-F0BB-DE4B-95CE-6DB70DBA9567}" type="datetimeFigureOut">
               <a:rPr lang="en-US" dirty="0"/>
               <a:pPr/>
-              <a:t>6/13/19</a:t>
+              <a:t>6/14/19</a:t>
             </a:fld>
             <a:endParaRPr lang="en-US" dirty="0"/>
           </a:p>
@@ -2599,7 +2599,7 @@
             <a:fld id="{B61BEF0D-F0BB-DE4B-95CE-6DB70DBA9567}" type="datetimeFigureOut">
               <a:rPr lang="en-US" dirty="0"/>
               <a:pPr/>
-              <a:t>6/13/19</a:t>
+              <a:t>6/14/19</a:t>
             </a:fld>
             <a:endParaRPr lang="en-US" dirty="0"/>
           </a:p>
@@ -2858,7 +2858,7 @@
             <a:fld id="{B61BEF0D-F0BB-DE4B-95CE-6DB70DBA9567}" type="datetimeFigureOut">
               <a:rPr lang="en-US" dirty="0"/>
               <a:pPr/>
-              <a:t>6/13/19</a:t>
+              <a:t>6/14/19</a:t>
             </a:fld>
             <a:endParaRPr lang="en-US" dirty="0"/>
           </a:p>
@@ -3184,7 +3184,7 @@
             <a:fld id="{B61BEF0D-F0BB-DE4B-95CE-6DB70DBA9567}" type="datetimeFigureOut">
               <a:rPr lang="en-US" dirty="0"/>
               <a:pPr/>
-              <a:t>6/13/19</a:t>
+              <a:t>6/14/19</a:t>
             </a:fld>
             <a:endParaRPr lang="en-US" dirty="0"/>
           </a:p>
@@ -3504,7 +3504,7 @@
             <a:fld id="{B61BEF0D-F0BB-DE4B-95CE-6DB70DBA9567}" type="datetimeFigureOut">
               <a:rPr lang="en-US" dirty="0"/>
               <a:pPr/>
-              <a:t>6/13/19</a:t>
+              <a:t>6/14/19</a:t>
             </a:fld>
             <a:endParaRPr lang="en-US" dirty="0"/>
           </a:p>
@@ -3958,7 +3958,7 @@
             <a:fld id="{B61BEF0D-F0BB-DE4B-95CE-6DB70DBA9567}" type="datetimeFigureOut">
               <a:rPr lang="en-US" dirty="0"/>
               <a:pPr/>
-              <a:t>6/13/19</a:t>
+              <a:t>6/14/19</a:t>
             </a:fld>
             <a:endParaRPr lang="en-US" dirty="0"/>
           </a:p>
@@ -4160,7 +4160,7 @@
             <a:fld id="{B61BEF0D-F0BB-DE4B-95CE-6DB70DBA9567}" type="datetimeFigureOut">
               <a:rPr lang="en-US" dirty="0"/>
               <a:pPr/>
-              <a:t>6/13/19</a:t>
+              <a:t>6/14/19</a:t>
             </a:fld>
             <a:endParaRPr lang="en-US" dirty="0"/>
           </a:p>
@@ -4334,7 +4334,7 @@
             <a:fld id="{B61BEF0D-F0BB-DE4B-95CE-6DB70DBA9567}" type="datetimeFigureOut">
               <a:rPr lang="en-US" dirty="0"/>
               <a:pPr/>
-              <a:t>6/13/19</a:t>
+              <a:t>6/14/19</a:t>
             </a:fld>
             <a:endParaRPr lang="en-US" dirty="0"/>
           </a:p>
@@ -4664,7 +4664,7 @@
             <a:fld id="{B61BEF0D-F0BB-DE4B-95CE-6DB70DBA9567}" type="datetimeFigureOut">
               <a:rPr lang="en-US" dirty="0"/>
               <a:pPr/>
-              <a:t>6/13/19</a:t>
+              <a:t>6/14/19</a:t>
             </a:fld>
             <a:endParaRPr lang="en-US" dirty="0"/>
           </a:p>
@@ -5006,7 +5006,7 @@
             <a:fld id="{B61BEF0D-F0BB-DE4B-95CE-6DB70DBA9567}" type="datetimeFigureOut">
               <a:rPr lang="en-US" dirty="0"/>
               <a:pPr/>
-              <a:t>6/13/19</a:t>
+              <a:t>6/14/19</a:t>
             </a:fld>
             <a:endParaRPr lang="en-US" dirty="0"/>
           </a:p>
@@ -7120,7 +7120,7 @@
             <a:fld id="{B61BEF0D-F0BB-DE4B-95CE-6DB70DBA9567}" type="datetimeFigureOut">
               <a:rPr lang="en-US" dirty="0"/>
               <a:pPr/>
-              <a:t>6/13/19</a:t>
+              <a:t>6/14/19</a:t>
             </a:fld>
             <a:endParaRPr lang="en-US" dirty="0"/>
           </a:p>
@@ -10375,7 +10375,7 @@
         </p:nvSpPr>
         <p:spPr>
           <a:xfrm>
-            <a:off x="3775267" y="624109"/>
+            <a:off x="3906789" y="554441"/>
             <a:ext cx="4641465" cy="581235"/>
           </a:xfrm>
         </p:spPr>
@@ -10410,7 +10410,7 @@
         </p:nvSpPr>
         <p:spPr>
           <a:xfrm>
-            <a:off x="3421290" y="4973761"/>
+            <a:off x="3366263" y="4973761"/>
             <a:ext cx="5459474" cy="1122239"/>
           </a:xfrm>
           <a:solidFill>
@@ -10579,10 +10579,10 @@
       </p:sp>
       <p:pic>
         <p:nvPicPr>
-          <p:cNvPr id="6" name="Picture 5">
+          <p:cNvPr id="5" name="Picture 4">
             <a:extLst>
               <a:ext uri="{FF2B5EF4-FFF2-40B4-BE49-F238E27FC236}">
-                <a16:creationId xmlns:a16="http://schemas.microsoft.com/office/drawing/2014/main" id="{428B9DE2-D378-6B47-9837-9D08740AF470}"/>
+                <a16:creationId xmlns:a16="http://schemas.microsoft.com/office/drawing/2014/main" id="{1AD20E8C-510C-F546-94B0-2607A2CE3A58}"/>
               </a:ext>
             </a:extLst>
           </p:cNvPr>
@@ -10599,8 +10599,8 @@
         </p:blipFill>
         <p:spPr>
           <a:xfrm>
-            <a:off x="3775267" y="2135082"/>
-            <a:ext cx="4641465" cy="2431950"/>
+            <a:off x="3673763" y="1205343"/>
+            <a:ext cx="4874491" cy="3629085"/>
           </a:xfrm>
           <a:prstGeom prst="rect">
             <a:avLst/>
@@ -10946,7 +10946,23 @@
           <a:bodyPr/>
           <a:lstStyle/>
           <a:p>
-            <a:endParaRPr lang="en-US"/>
+            <a:r>
+              <a:rPr lang="en-CA" dirty="0"/>
+              <a:t>Another technique to reduce model complexity and prevent over-fitting</a:t>
+            </a:r>
+          </a:p>
+          <a:p>
+            <a:r>
+              <a:rPr lang="en-CA" dirty="0"/>
+              <a:t>It estimates sparse coefficients, that is, it reduces the number of features that</a:t>
+            </a:r>
+          </a:p>
+          <a:p>
+            <a:r>
+              <a:rPr lang="en-CA" dirty="0"/>
+              <a:t>will be used in the regression model, by preferring a solution with fewer coefficients.</a:t>
+            </a:r>
+            <a:endParaRPr lang="en-US" dirty="0"/>
           </a:p>
         </p:txBody>
       </p:sp>
@@ -11032,11 +11048,49 @@
         </p:blipFill>
         <p:spPr>
           <a:xfrm>
-            <a:off x="5541818" y="1264555"/>
-            <a:ext cx="6088255" cy="4566192"/>
+            <a:off x="5019526" y="872836"/>
+            <a:ext cx="6610547" cy="4957911"/>
           </a:xfrm>
         </p:spPr>
       </p:pic>
+      <p:sp>
+        <p:nvSpPr>
+          <p:cNvPr id="3" name="TextBox 2">
+            <a:extLst>
+              <a:ext uri="{FF2B5EF4-FFF2-40B4-BE49-F238E27FC236}">
+                <a16:creationId xmlns:a16="http://schemas.microsoft.com/office/drawing/2014/main" id="{E55CE620-3DBA-FC41-A11D-E6998E172BC4}"/>
+              </a:ext>
+            </a:extLst>
+          </p:cNvPr>
+          <p:cNvSpPr txBox="1"/>
+          <p:nvPr/>
+        </p:nvSpPr>
+        <p:spPr>
+          <a:xfrm>
+            <a:off x="1122217" y="2729345"/>
+            <a:ext cx="4267201" cy="830997"/>
+          </a:xfrm>
+          <a:prstGeom prst="rect">
+            <a:avLst/>
+          </a:prstGeom>
+          <a:noFill/>
+        </p:spPr>
+        <p:txBody>
+          <a:bodyPr wrap="square" lIns="0" tIns="0" rIns="0" bIns="0" rtlCol="0">
+            <a:spAutoFit/>
+          </a:bodyPr>
+          <a:lstStyle/>
+          <a:p>
+            <a:r>
+              <a:rPr lang="en-CA" dirty="0"/>
+              <a:t>Target = 308.078485*BMI + 48.349328*BP + 270.965511*Tch.</a:t>
+            </a:r>
+          </a:p>
+          <a:p>
+            <a:endParaRPr lang="en-US" dirty="0"/>
+          </a:p>
+        </p:txBody>
+      </p:sp>
     </p:spTree>
     <p:extLst>
       <p:ext uri="{BB962C8B-B14F-4D97-AF65-F5344CB8AC3E}">

</xml_diff>

<commit_message>
Adding a few code segments
</commit_message>
<xml_diff>
--- a/Diabetes_Presentation.pptx
+++ b/Diabetes_Presentation.pptx
@@ -310,7 +310,7 @@
             <a:fld id="{B61BEF0D-F0BB-DE4B-95CE-6DB70DBA9567}" type="datetimeFigureOut">
               <a:rPr lang="en-US" dirty="0"/>
               <a:pPr/>
-              <a:t>6/14/19</a:t>
+              <a:t>6/15/19</a:t>
             </a:fld>
             <a:endParaRPr lang="en-US" dirty="0"/>
           </a:p>
@@ -645,7 +645,7 @@
             <a:fld id="{B61BEF0D-F0BB-DE4B-95CE-6DB70DBA9567}" type="datetimeFigureOut">
               <a:rPr lang="en-US" dirty="0"/>
               <a:pPr/>
-              <a:t>6/14/19</a:t>
+              <a:t>6/15/19</a:t>
             </a:fld>
             <a:endParaRPr lang="en-US" dirty="0"/>
           </a:p>
@@ -1043,7 +1043,7 @@
             <a:fld id="{B61BEF0D-F0BB-DE4B-95CE-6DB70DBA9567}" type="datetimeFigureOut">
               <a:rPr lang="en-US" dirty="0"/>
               <a:pPr/>
-              <a:t>6/14/19</a:t>
+              <a:t>6/15/19</a:t>
             </a:fld>
             <a:endParaRPr lang="en-US" dirty="0"/>
           </a:p>
@@ -1376,7 +1376,7 @@
             <a:fld id="{B61BEF0D-F0BB-DE4B-95CE-6DB70DBA9567}" type="datetimeFigureOut">
               <a:rPr lang="en-US" dirty="0"/>
               <a:pPr/>
-              <a:t>6/14/19</a:t>
+              <a:t>6/15/19</a:t>
             </a:fld>
             <a:endParaRPr lang="en-US" dirty="0"/>
           </a:p>
@@ -1693,7 +1693,7 @@
             <a:fld id="{B61BEF0D-F0BB-DE4B-95CE-6DB70DBA9567}" type="datetimeFigureOut">
               <a:rPr lang="en-US" dirty="0"/>
               <a:pPr/>
-              <a:t>6/14/19</a:t>
+              <a:t>6/15/19</a:t>
             </a:fld>
             <a:endParaRPr lang="en-US" dirty="0"/>
           </a:p>
@@ -2086,7 +2086,7 @@
             <a:fld id="{B61BEF0D-F0BB-DE4B-95CE-6DB70DBA9567}" type="datetimeFigureOut">
               <a:rPr lang="en-US" dirty="0"/>
               <a:pPr/>
-              <a:t>6/14/19</a:t>
+              <a:t>6/15/19</a:t>
             </a:fld>
             <a:endParaRPr lang="en-US" dirty="0"/>
           </a:p>
@@ -2340,7 +2340,7 @@
             <a:fld id="{B61BEF0D-F0BB-DE4B-95CE-6DB70DBA9567}" type="datetimeFigureOut">
               <a:rPr lang="en-US" dirty="0"/>
               <a:pPr/>
-              <a:t>6/14/19</a:t>
+              <a:t>6/15/19</a:t>
             </a:fld>
             <a:endParaRPr lang="en-US" dirty="0"/>
           </a:p>
@@ -2599,7 +2599,7 @@
             <a:fld id="{B61BEF0D-F0BB-DE4B-95CE-6DB70DBA9567}" type="datetimeFigureOut">
               <a:rPr lang="en-US" dirty="0"/>
               <a:pPr/>
-              <a:t>6/14/19</a:t>
+              <a:t>6/15/19</a:t>
             </a:fld>
             <a:endParaRPr lang="en-US" dirty="0"/>
           </a:p>
@@ -2858,7 +2858,7 @@
             <a:fld id="{B61BEF0D-F0BB-DE4B-95CE-6DB70DBA9567}" type="datetimeFigureOut">
               <a:rPr lang="en-US" dirty="0"/>
               <a:pPr/>
-              <a:t>6/14/19</a:t>
+              <a:t>6/15/19</a:t>
             </a:fld>
             <a:endParaRPr lang="en-US" dirty="0"/>
           </a:p>
@@ -3184,7 +3184,7 @@
             <a:fld id="{B61BEF0D-F0BB-DE4B-95CE-6DB70DBA9567}" type="datetimeFigureOut">
               <a:rPr lang="en-US" dirty="0"/>
               <a:pPr/>
-              <a:t>6/14/19</a:t>
+              <a:t>6/15/19</a:t>
             </a:fld>
             <a:endParaRPr lang="en-US" dirty="0"/>
           </a:p>
@@ -3504,7 +3504,7 @@
             <a:fld id="{B61BEF0D-F0BB-DE4B-95CE-6DB70DBA9567}" type="datetimeFigureOut">
               <a:rPr lang="en-US" dirty="0"/>
               <a:pPr/>
-              <a:t>6/14/19</a:t>
+              <a:t>6/15/19</a:t>
             </a:fld>
             <a:endParaRPr lang="en-US" dirty="0"/>
           </a:p>
@@ -3958,7 +3958,7 @@
             <a:fld id="{B61BEF0D-F0BB-DE4B-95CE-6DB70DBA9567}" type="datetimeFigureOut">
               <a:rPr lang="en-US" dirty="0"/>
               <a:pPr/>
-              <a:t>6/14/19</a:t>
+              <a:t>6/15/19</a:t>
             </a:fld>
             <a:endParaRPr lang="en-US" dirty="0"/>
           </a:p>
@@ -4160,7 +4160,7 @@
             <a:fld id="{B61BEF0D-F0BB-DE4B-95CE-6DB70DBA9567}" type="datetimeFigureOut">
               <a:rPr lang="en-US" dirty="0"/>
               <a:pPr/>
-              <a:t>6/14/19</a:t>
+              <a:t>6/15/19</a:t>
             </a:fld>
             <a:endParaRPr lang="en-US" dirty="0"/>
           </a:p>
@@ -4334,7 +4334,7 @@
             <a:fld id="{B61BEF0D-F0BB-DE4B-95CE-6DB70DBA9567}" type="datetimeFigureOut">
               <a:rPr lang="en-US" dirty="0"/>
               <a:pPr/>
-              <a:t>6/14/19</a:t>
+              <a:t>6/15/19</a:t>
             </a:fld>
             <a:endParaRPr lang="en-US" dirty="0"/>
           </a:p>
@@ -4664,7 +4664,7 @@
             <a:fld id="{B61BEF0D-F0BB-DE4B-95CE-6DB70DBA9567}" type="datetimeFigureOut">
               <a:rPr lang="en-US" dirty="0"/>
               <a:pPr/>
-              <a:t>6/14/19</a:t>
+              <a:t>6/15/19</a:t>
             </a:fld>
             <a:endParaRPr lang="en-US" dirty="0"/>
           </a:p>
@@ -5006,7 +5006,7 @@
             <a:fld id="{B61BEF0D-F0BB-DE4B-95CE-6DB70DBA9567}" type="datetimeFigureOut">
               <a:rPr lang="en-US" dirty="0"/>
               <a:pPr/>
-              <a:t>6/14/19</a:t>
+              <a:t>6/15/19</a:t>
             </a:fld>
             <a:endParaRPr lang="en-US" dirty="0"/>
           </a:p>
@@ -7120,7 +7120,7 @@
             <a:fld id="{B61BEF0D-F0BB-DE4B-95CE-6DB70DBA9567}" type="datetimeFigureOut">
               <a:rPr lang="en-US" dirty="0"/>
               <a:pPr/>
-              <a:t>6/14/19</a:t>
+              <a:t>6/15/19</a:t>
             </a:fld>
             <a:endParaRPr lang="en-US" dirty="0"/>
           </a:p>
@@ -10322,11 +10322,715 @@
         </p:blipFill>
         <p:spPr>
           <a:xfrm>
-            <a:off x="2133600" y="1557867"/>
-            <a:ext cx="9843029" cy="4921515"/>
+            <a:off x="3381625" y="1587051"/>
+            <a:ext cx="8810375" cy="4405188"/>
           </a:xfrm>
         </p:spPr>
       </p:pic>
+      <p:sp>
+        <p:nvSpPr>
+          <p:cNvPr id="3" name="Rectangle 2">
+            <a:extLst>
+              <a:ext uri="{FF2B5EF4-FFF2-40B4-BE49-F238E27FC236}">
+                <a16:creationId xmlns:a16="http://schemas.microsoft.com/office/drawing/2014/main" id="{3B58F1C2-2EFF-D947-B81D-F9798E7A8ED0}"/>
+              </a:ext>
+            </a:extLst>
+          </p:cNvPr>
+          <p:cNvSpPr/>
+          <p:nvPr/>
+        </p:nvSpPr>
+        <p:spPr>
+          <a:xfrm>
+            <a:off x="207523" y="2031153"/>
+            <a:ext cx="3051243" cy="4832092"/>
+          </a:xfrm>
+          <a:prstGeom prst="rect">
+            <a:avLst/>
+          </a:prstGeom>
+          <a:solidFill>
+            <a:schemeClr val="tx1"/>
+          </a:solidFill>
+          <a:ln>
+            <a:solidFill>
+              <a:schemeClr val="bg1"/>
+            </a:solidFill>
+          </a:ln>
+        </p:spPr>
+        <p:txBody>
+          <a:bodyPr wrap="square">
+            <a:spAutoFit/>
+          </a:bodyPr>
+          <a:lstStyle/>
+          <a:p>
+            <a:r>
+              <a:rPr lang="en-US" sz="1100" dirty="0">
+                <a:solidFill>
+                  <a:schemeClr val="bg1"/>
+                </a:solidFill>
+              </a:rPr>
+              <a:t>fig, axes = </a:t>
+            </a:r>
+            <a:r>
+              <a:rPr lang="en-US" sz="1100" dirty="0" err="1">
+                <a:solidFill>
+                  <a:schemeClr val="bg1"/>
+                </a:solidFill>
+              </a:rPr>
+              <a:t>plt.subplots</a:t>
+            </a:r>
+            <a:r>
+              <a:rPr lang="en-US" sz="1100" dirty="0">
+                <a:solidFill>
+                  <a:schemeClr val="bg1"/>
+                </a:solidFill>
+              </a:rPr>
+              <a:t>(</a:t>
+            </a:r>
+            <a:r>
+              <a:rPr lang="en-US" sz="1100" dirty="0" err="1">
+                <a:solidFill>
+                  <a:schemeClr val="bg1"/>
+                </a:solidFill>
+              </a:rPr>
+              <a:t>ncols</a:t>
+            </a:r>
+            <a:r>
+              <a:rPr lang="en-US" sz="1100" dirty="0">
+                <a:solidFill>
+                  <a:schemeClr val="bg1"/>
+                </a:solidFill>
+              </a:rPr>
+              <a:t>=5, </a:t>
+            </a:r>
+            <a:r>
+              <a:rPr lang="en-US" sz="1100" dirty="0" err="1">
+                <a:solidFill>
+                  <a:schemeClr val="bg1"/>
+                </a:solidFill>
+              </a:rPr>
+              <a:t>nrows</a:t>
+            </a:r>
+            <a:r>
+              <a:rPr lang="en-US" sz="1100" dirty="0">
+                <a:solidFill>
+                  <a:schemeClr val="bg1"/>
+                </a:solidFill>
+              </a:rPr>
+              <a:t>=2, </a:t>
+            </a:r>
+            <a:r>
+              <a:rPr lang="en-US" sz="1100" dirty="0" err="1">
+                <a:solidFill>
+                  <a:schemeClr val="bg1"/>
+                </a:solidFill>
+              </a:rPr>
+              <a:t>figsize</a:t>
+            </a:r>
+            <a:r>
+              <a:rPr lang="en-US" sz="1100" dirty="0">
+                <a:solidFill>
+                  <a:schemeClr val="bg1"/>
+                </a:solidFill>
+              </a:rPr>
+              <a:t>=(10, 5))</a:t>
+            </a:r>
+          </a:p>
+          <a:p>
+            <a:r>
+              <a:rPr lang="en-US" sz="1100" dirty="0">
+                <a:solidFill>
+                  <a:schemeClr val="bg1"/>
+                </a:solidFill>
+              </a:rPr>
+              <a:t>for </a:t>
+            </a:r>
+            <a:r>
+              <a:rPr lang="en-US" sz="1100" dirty="0" err="1">
+                <a:solidFill>
+                  <a:schemeClr val="bg1"/>
+                </a:solidFill>
+              </a:rPr>
+              <a:t>indx</a:t>
+            </a:r>
+            <a:r>
+              <a:rPr lang="en-US" sz="1100" dirty="0">
+                <a:solidFill>
+                  <a:schemeClr val="bg1"/>
+                </a:solidFill>
+              </a:rPr>
+              <a:t>, col in enumerate(</a:t>
+            </a:r>
+            <a:r>
+              <a:rPr lang="en-US" sz="1100" dirty="0" err="1">
+                <a:solidFill>
+                  <a:schemeClr val="bg1"/>
+                </a:solidFill>
+              </a:rPr>
+              <a:t>diabetes_unaltered.columns</a:t>
+            </a:r>
+            <a:r>
+              <a:rPr lang="en-US" sz="1100" dirty="0">
+                <a:solidFill>
+                  <a:schemeClr val="bg1"/>
+                </a:solidFill>
+              </a:rPr>
+              <a:t>):</a:t>
+            </a:r>
+          </a:p>
+          <a:p>
+            <a:r>
+              <a:rPr lang="en-US" sz="1100" dirty="0">
+                <a:solidFill>
+                  <a:schemeClr val="bg1"/>
+                </a:solidFill>
+              </a:rPr>
+              <a:t>    outliers = </a:t>
+            </a:r>
+            <a:r>
+              <a:rPr lang="en-US" sz="1100" dirty="0" err="1">
+                <a:solidFill>
+                  <a:schemeClr val="bg1"/>
+                </a:solidFill>
+              </a:rPr>
+              <a:t>dict</a:t>
+            </a:r>
+            <a:r>
+              <a:rPr lang="en-US" sz="1100" dirty="0">
+                <a:solidFill>
+                  <a:schemeClr val="bg1"/>
+                </a:solidFill>
+              </a:rPr>
+              <a:t>(</a:t>
+            </a:r>
+            <a:r>
+              <a:rPr lang="en-US" sz="1100" dirty="0" err="1">
+                <a:solidFill>
+                  <a:schemeClr val="bg1"/>
+                </a:solidFill>
+              </a:rPr>
+              <a:t>markerfacecolor</a:t>
+            </a:r>
+            <a:r>
+              <a:rPr lang="en-US" sz="1100" dirty="0">
+                <a:solidFill>
+                  <a:schemeClr val="bg1"/>
+                </a:solidFill>
+              </a:rPr>
+              <a:t>='r', marker='D')</a:t>
+            </a:r>
+          </a:p>
+          <a:p>
+            <a:r>
+              <a:rPr lang="en-US" sz="1100" dirty="0">
+                <a:solidFill>
+                  <a:schemeClr val="bg1"/>
+                </a:solidFill>
+              </a:rPr>
+              <a:t>    if col != 'Sex':</a:t>
+            </a:r>
+          </a:p>
+          <a:p>
+            <a:r>
+              <a:rPr lang="en-US" sz="1100" dirty="0">
+                <a:solidFill>
+                  <a:schemeClr val="bg1"/>
+                </a:solidFill>
+              </a:rPr>
+              <a:t>        if </a:t>
+            </a:r>
+            <a:r>
+              <a:rPr lang="en-US" sz="1100" dirty="0" err="1">
+                <a:solidFill>
+                  <a:schemeClr val="bg1"/>
+                </a:solidFill>
+              </a:rPr>
+              <a:t>indx</a:t>
+            </a:r>
+            <a:r>
+              <a:rPr lang="en-US" sz="1100" dirty="0">
+                <a:solidFill>
+                  <a:schemeClr val="bg1"/>
+                </a:solidFill>
+              </a:rPr>
+              <a:t> == 0:</a:t>
+            </a:r>
+          </a:p>
+          <a:p>
+            <a:r>
+              <a:rPr lang="en-US" sz="1100" dirty="0">
+                <a:solidFill>
+                  <a:schemeClr val="bg1"/>
+                </a:solidFill>
+              </a:rPr>
+              <a:t>            axes[0][</a:t>
+            </a:r>
+            <a:r>
+              <a:rPr lang="en-US" sz="1100" dirty="0" err="1">
+                <a:solidFill>
+                  <a:schemeClr val="bg1"/>
+                </a:solidFill>
+              </a:rPr>
+              <a:t>indx</a:t>
+            </a:r>
+            <a:r>
+              <a:rPr lang="en-US" sz="1100" dirty="0">
+                <a:solidFill>
+                  <a:schemeClr val="bg1"/>
+                </a:solidFill>
+              </a:rPr>
+              <a:t>].boxplot(</a:t>
+            </a:r>
+            <a:r>
+              <a:rPr lang="en-US" sz="1100" dirty="0" err="1">
+                <a:solidFill>
+                  <a:schemeClr val="bg1"/>
+                </a:solidFill>
+              </a:rPr>
+              <a:t>diabetes_unaltered</a:t>
+            </a:r>
+            <a:r>
+              <a:rPr lang="en-US" sz="1100" dirty="0">
+                <a:solidFill>
+                  <a:schemeClr val="bg1"/>
+                </a:solidFill>
+              </a:rPr>
+              <a:t>[col], </a:t>
+            </a:r>
+            <a:r>
+              <a:rPr lang="en-US" sz="1100" dirty="0" err="1">
+                <a:solidFill>
+                  <a:schemeClr val="bg1"/>
+                </a:solidFill>
+              </a:rPr>
+              <a:t>flierprops</a:t>
+            </a:r>
+            <a:r>
+              <a:rPr lang="en-US" sz="1100" dirty="0">
+                <a:solidFill>
+                  <a:schemeClr val="bg1"/>
+                </a:solidFill>
+              </a:rPr>
+              <a:t>=outliers)</a:t>
+            </a:r>
+          </a:p>
+          <a:p>
+            <a:r>
+              <a:rPr lang="en-US" sz="1100" dirty="0">
+                <a:solidFill>
+                  <a:schemeClr val="bg1"/>
+                </a:solidFill>
+              </a:rPr>
+              <a:t>            axes[0][</a:t>
+            </a:r>
+            <a:r>
+              <a:rPr lang="en-US" sz="1100" dirty="0" err="1">
+                <a:solidFill>
+                  <a:schemeClr val="bg1"/>
+                </a:solidFill>
+              </a:rPr>
+              <a:t>indx</a:t>
+            </a:r>
+            <a:r>
+              <a:rPr lang="en-US" sz="1100" dirty="0">
+                <a:solidFill>
+                  <a:schemeClr val="bg1"/>
+                </a:solidFill>
+              </a:rPr>
+              <a:t>].</a:t>
+            </a:r>
+            <a:r>
+              <a:rPr lang="en-US" sz="1100" dirty="0" err="1">
+                <a:solidFill>
+                  <a:schemeClr val="bg1"/>
+                </a:solidFill>
+              </a:rPr>
+              <a:t>set_ylabel</a:t>
+            </a:r>
+            <a:r>
+              <a:rPr lang="en-US" sz="1100" dirty="0">
+                <a:solidFill>
+                  <a:schemeClr val="bg1"/>
+                </a:solidFill>
+              </a:rPr>
+              <a:t>(col)</a:t>
+            </a:r>
+          </a:p>
+          <a:p>
+            <a:r>
+              <a:rPr lang="en-US" sz="1100" dirty="0">
+                <a:solidFill>
+                  <a:schemeClr val="bg1"/>
+                </a:solidFill>
+              </a:rPr>
+              <a:t>        </a:t>
+            </a:r>
+            <a:r>
+              <a:rPr lang="en-US" sz="1100" dirty="0" err="1">
+                <a:solidFill>
+                  <a:schemeClr val="bg1"/>
+                </a:solidFill>
+              </a:rPr>
+              <a:t>elif</a:t>
+            </a:r>
+            <a:r>
+              <a:rPr lang="en-US" sz="1100" dirty="0">
+                <a:solidFill>
+                  <a:schemeClr val="bg1"/>
+                </a:solidFill>
+              </a:rPr>
+              <a:t> </a:t>
+            </a:r>
+            <a:r>
+              <a:rPr lang="en-US" sz="1100" dirty="0" err="1">
+                <a:solidFill>
+                  <a:schemeClr val="bg1"/>
+                </a:solidFill>
+              </a:rPr>
+              <a:t>indx</a:t>
+            </a:r>
+            <a:r>
+              <a:rPr lang="en-US" sz="1100" dirty="0">
+                <a:solidFill>
+                  <a:schemeClr val="bg1"/>
+                </a:solidFill>
+              </a:rPr>
+              <a:t> &lt;= 5 and </a:t>
+            </a:r>
+            <a:r>
+              <a:rPr lang="en-US" sz="1100" dirty="0" err="1">
+                <a:solidFill>
+                  <a:schemeClr val="bg1"/>
+                </a:solidFill>
+              </a:rPr>
+              <a:t>indx</a:t>
+            </a:r>
+            <a:r>
+              <a:rPr lang="en-US" sz="1100" dirty="0">
+                <a:solidFill>
+                  <a:schemeClr val="bg1"/>
+                </a:solidFill>
+              </a:rPr>
+              <a:t> &gt;=2:</a:t>
+            </a:r>
+          </a:p>
+          <a:p>
+            <a:r>
+              <a:rPr lang="en-US" sz="1100" dirty="0">
+                <a:solidFill>
+                  <a:schemeClr val="bg1"/>
+                </a:solidFill>
+              </a:rPr>
+              <a:t>            axes[0][6-indx].boxplot(</a:t>
+            </a:r>
+            <a:r>
+              <a:rPr lang="en-US" sz="1100" dirty="0" err="1">
+                <a:solidFill>
+                  <a:schemeClr val="bg1"/>
+                </a:solidFill>
+              </a:rPr>
+              <a:t>diabetes_unaltered</a:t>
+            </a:r>
+            <a:r>
+              <a:rPr lang="en-US" sz="1100" dirty="0">
+                <a:solidFill>
+                  <a:schemeClr val="bg1"/>
+                </a:solidFill>
+              </a:rPr>
+              <a:t>[col], </a:t>
+            </a:r>
+            <a:r>
+              <a:rPr lang="en-US" sz="1100" dirty="0" err="1">
+                <a:solidFill>
+                  <a:schemeClr val="bg1"/>
+                </a:solidFill>
+              </a:rPr>
+              <a:t>flierprops</a:t>
+            </a:r>
+            <a:r>
+              <a:rPr lang="en-US" sz="1100" dirty="0">
+                <a:solidFill>
+                  <a:schemeClr val="bg1"/>
+                </a:solidFill>
+              </a:rPr>
+              <a:t>=outliers)</a:t>
+            </a:r>
+          </a:p>
+          <a:p>
+            <a:r>
+              <a:rPr lang="en-US" sz="1100" dirty="0">
+                <a:solidFill>
+                  <a:schemeClr val="bg1"/>
+                </a:solidFill>
+              </a:rPr>
+              <a:t>            axes[0][6-indx].</a:t>
+            </a:r>
+            <a:r>
+              <a:rPr lang="en-US" sz="1100" dirty="0" err="1">
+                <a:solidFill>
+                  <a:schemeClr val="bg1"/>
+                </a:solidFill>
+              </a:rPr>
+              <a:t>set_ylabel</a:t>
+            </a:r>
+            <a:r>
+              <a:rPr lang="en-US" sz="1100" dirty="0">
+                <a:solidFill>
+                  <a:schemeClr val="bg1"/>
+                </a:solidFill>
+              </a:rPr>
+              <a:t>(col)</a:t>
+            </a:r>
+          </a:p>
+          <a:p>
+            <a:r>
+              <a:rPr lang="en-US" sz="1100" dirty="0">
+                <a:solidFill>
+                  <a:schemeClr val="bg1"/>
+                </a:solidFill>
+              </a:rPr>
+              <a:t>        </a:t>
+            </a:r>
+            <a:r>
+              <a:rPr lang="en-US" sz="1100" dirty="0" err="1">
+                <a:solidFill>
+                  <a:schemeClr val="bg1"/>
+                </a:solidFill>
+              </a:rPr>
+              <a:t>elif</a:t>
+            </a:r>
+            <a:r>
+              <a:rPr lang="en-US" sz="1100" dirty="0">
+                <a:solidFill>
+                  <a:schemeClr val="bg1"/>
+                </a:solidFill>
+              </a:rPr>
+              <a:t> </a:t>
+            </a:r>
+            <a:r>
+              <a:rPr lang="en-US" sz="1100" dirty="0" err="1">
+                <a:solidFill>
+                  <a:schemeClr val="bg1"/>
+                </a:solidFill>
+              </a:rPr>
+              <a:t>indx</a:t>
+            </a:r>
+            <a:r>
+              <a:rPr lang="en-US" sz="1100" dirty="0">
+                <a:solidFill>
+                  <a:schemeClr val="bg1"/>
+                </a:solidFill>
+              </a:rPr>
+              <a:t> &lt;=10 and </a:t>
+            </a:r>
+            <a:r>
+              <a:rPr lang="en-US" sz="1100" dirty="0" err="1">
+                <a:solidFill>
+                  <a:schemeClr val="bg1"/>
+                </a:solidFill>
+              </a:rPr>
+              <a:t>indx</a:t>
+            </a:r>
+            <a:r>
+              <a:rPr lang="en-US" sz="1100" dirty="0">
+                <a:solidFill>
+                  <a:schemeClr val="bg1"/>
+                </a:solidFill>
+              </a:rPr>
+              <a:t>&gt;=6:</a:t>
+            </a:r>
+          </a:p>
+          <a:p>
+            <a:r>
+              <a:rPr lang="en-US" sz="1100" dirty="0">
+                <a:solidFill>
+                  <a:schemeClr val="bg1"/>
+                </a:solidFill>
+              </a:rPr>
+              <a:t>            axes[1][10-indx].boxplot(</a:t>
+            </a:r>
+            <a:r>
+              <a:rPr lang="en-US" sz="1100" dirty="0" err="1">
+                <a:solidFill>
+                  <a:schemeClr val="bg1"/>
+                </a:solidFill>
+              </a:rPr>
+              <a:t>diabetes_unaltered</a:t>
+            </a:r>
+            <a:r>
+              <a:rPr lang="en-US" sz="1100" dirty="0">
+                <a:solidFill>
+                  <a:schemeClr val="bg1"/>
+                </a:solidFill>
+              </a:rPr>
+              <a:t>[col], </a:t>
+            </a:r>
+            <a:r>
+              <a:rPr lang="en-US" sz="1100" dirty="0" err="1">
+                <a:solidFill>
+                  <a:schemeClr val="bg1"/>
+                </a:solidFill>
+              </a:rPr>
+              <a:t>flierprops</a:t>
+            </a:r>
+            <a:r>
+              <a:rPr lang="en-US" sz="1100" dirty="0">
+                <a:solidFill>
+                  <a:schemeClr val="bg1"/>
+                </a:solidFill>
+              </a:rPr>
+              <a:t>=outliers)</a:t>
+            </a:r>
+          </a:p>
+          <a:p>
+            <a:r>
+              <a:rPr lang="en-US" sz="1100" dirty="0">
+                <a:solidFill>
+                  <a:schemeClr val="bg1"/>
+                </a:solidFill>
+              </a:rPr>
+              <a:t>            axes[1][10-indx].</a:t>
+            </a:r>
+            <a:r>
+              <a:rPr lang="en-US" sz="1100" dirty="0" err="1">
+                <a:solidFill>
+                  <a:schemeClr val="bg1"/>
+                </a:solidFill>
+              </a:rPr>
+              <a:t>set_ylabel</a:t>
+            </a:r>
+            <a:r>
+              <a:rPr lang="en-US" sz="1100" dirty="0">
+                <a:solidFill>
+                  <a:schemeClr val="bg1"/>
+                </a:solidFill>
+              </a:rPr>
+              <a:t>(col)</a:t>
+            </a:r>
+          </a:p>
+          <a:p>
+            <a:r>
+              <a:rPr lang="en-US" sz="1100" dirty="0" err="1">
+                <a:solidFill>
+                  <a:schemeClr val="bg1"/>
+                </a:solidFill>
+              </a:rPr>
+              <a:t>fig.suptitle</a:t>
+            </a:r>
+            <a:r>
+              <a:rPr lang="en-US" sz="1100" dirty="0">
+                <a:solidFill>
+                  <a:schemeClr val="bg1"/>
+                </a:solidFill>
+              </a:rPr>
+              <a:t>("Boxplots for Diabetes Features")</a:t>
+            </a:r>
+          </a:p>
+          <a:p>
+            <a:r>
+              <a:rPr lang="en-US" sz="1100" dirty="0" err="1">
+                <a:solidFill>
+                  <a:schemeClr val="bg1"/>
+                </a:solidFill>
+              </a:rPr>
+              <a:t>fig.tight_layout</a:t>
+            </a:r>
+            <a:r>
+              <a:rPr lang="en-US" sz="1100" dirty="0">
+                <a:solidFill>
+                  <a:schemeClr val="bg1"/>
+                </a:solidFill>
+              </a:rPr>
+              <a:t>()</a:t>
+            </a:r>
+          </a:p>
+          <a:p>
+            <a:r>
+              <a:rPr lang="en-US" sz="1100" dirty="0" err="1">
+                <a:solidFill>
+                  <a:schemeClr val="bg1"/>
+                </a:solidFill>
+              </a:rPr>
+              <a:t>fig.subplots_adjust</a:t>
+            </a:r>
+            <a:r>
+              <a:rPr lang="en-US" sz="1100" dirty="0">
+                <a:solidFill>
+                  <a:schemeClr val="bg1"/>
+                </a:solidFill>
+              </a:rPr>
+              <a:t>(top=0.88)</a:t>
+            </a:r>
+          </a:p>
+          <a:p>
+            <a:r>
+              <a:rPr lang="en-US" sz="1100" dirty="0" err="1">
+                <a:solidFill>
+                  <a:schemeClr val="bg1"/>
+                </a:solidFill>
+              </a:rPr>
+              <a:t>plt.savefig</a:t>
+            </a:r>
+            <a:r>
+              <a:rPr lang="en-US" sz="1100" dirty="0">
+                <a:solidFill>
+                  <a:schemeClr val="bg1"/>
+                </a:solidFill>
+              </a:rPr>
+              <a:t>(</a:t>
+            </a:r>
+            <a:r>
+              <a:rPr lang="en-US" sz="1100" dirty="0" err="1">
+                <a:solidFill>
+                  <a:schemeClr val="bg1"/>
+                </a:solidFill>
+              </a:rPr>
+              <a:t>f'plots</a:t>
+            </a:r>
+            <a:r>
+              <a:rPr lang="en-US" sz="1100" dirty="0">
+                <a:solidFill>
+                  <a:schemeClr val="bg1"/>
+                </a:solidFill>
+              </a:rPr>
+              <a:t>/</a:t>
+            </a:r>
+            <a:r>
+              <a:rPr lang="en-US" sz="1100" dirty="0" err="1">
+                <a:solidFill>
+                  <a:schemeClr val="bg1"/>
+                </a:solidFill>
+              </a:rPr>
+              <a:t>Boxplots_features</a:t>
+            </a:r>
+            <a:r>
+              <a:rPr lang="en-US" sz="1100" dirty="0">
+                <a:solidFill>
+                  <a:schemeClr val="bg1"/>
+                </a:solidFill>
+              </a:rPr>
+              <a:t>')</a:t>
+            </a:r>
+          </a:p>
+          <a:p>
+            <a:r>
+              <a:rPr lang="en-US" sz="1100" dirty="0" err="1">
+                <a:solidFill>
+                  <a:schemeClr val="bg1"/>
+                </a:solidFill>
+              </a:rPr>
+              <a:t>plt.clf</a:t>
+            </a:r>
+            <a:r>
+              <a:rPr lang="en-US" sz="1100" dirty="0">
+                <a:solidFill>
+                  <a:schemeClr val="bg1"/>
+                </a:solidFill>
+              </a:rPr>
+              <a:t>()</a:t>
+            </a:r>
+          </a:p>
+        </p:txBody>
+      </p:sp>
     </p:spTree>
     <p:extLst>
       <p:ext uri="{BB962C8B-B14F-4D97-AF65-F5344CB8AC3E}">
@@ -10699,6 +11403,160 @@
           </a:xfrm>
         </p:spPr>
       </p:pic>
+      <p:sp>
+        <p:nvSpPr>
+          <p:cNvPr id="3" name="Rectangle 2">
+            <a:extLst>
+              <a:ext uri="{FF2B5EF4-FFF2-40B4-BE49-F238E27FC236}">
+                <a16:creationId xmlns:a16="http://schemas.microsoft.com/office/drawing/2014/main" id="{E5B0AEFB-A226-E044-8D1C-3A43C20855F6}"/>
+              </a:ext>
+            </a:extLst>
+          </p:cNvPr>
+          <p:cNvSpPr/>
+          <p:nvPr/>
+        </p:nvSpPr>
+        <p:spPr>
+          <a:xfrm>
+            <a:off x="265889" y="3249438"/>
+            <a:ext cx="4153712" cy="1107996"/>
+          </a:xfrm>
+          <a:prstGeom prst="rect">
+            <a:avLst/>
+          </a:prstGeom>
+          <a:solidFill>
+            <a:schemeClr val="tx1"/>
+          </a:solidFill>
+          <a:ln>
+            <a:solidFill>
+              <a:schemeClr val="bg1"/>
+            </a:solidFill>
+          </a:ln>
+        </p:spPr>
+        <p:txBody>
+          <a:bodyPr wrap="square">
+            <a:spAutoFit/>
+          </a:bodyPr>
+          <a:lstStyle/>
+          <a:p>
+            <a:r>
+              <a:rPr lang="en-US" sz="1600" dirty="0" err="1">
+                <a:solidFill>
+                  <a:schemeClr val="bg1"/>
+                </a:solidFill>
+              </a:rPr>
+              <a:t>sns.pairplot</a:t>
+            </a:r>
+            <a:r>
+              <a:rPr lang="en-US" sz="1600" dirty="0">
+                <a:solidFill>
+                  <a:schemeClr val="bg1"/>
+                </a:solidFill>
+              </a:rPr>
+              <a:t>(</a:t>
+            </a:r>
+            <a:r>
+              <a:rPr lang="en-US" sz="1600" dirty="0" err="1">
+                <a:solidFill>
+                  <a:schemeClr val="bg1"/>
+                </a:solidFill>
+              </a:rPr>
+              <a:t>diabetes_df</a:t>
+            </a:r>
+            <a:r>
+              <a:rPr lang="en-US" sz="1600" dirty="0">
+                <a:solidFill>
+                  <a:schemeClr val="bg1"/>
+                </a:solidFill>
+              </a:rPr>
+              <a:t>, hue='Sex', </a:t>
+            </a:r>
+            <a:r>
+              <a:rPr lang="en-US" sz="1600" dirty="0" err="1">
+                <a:solidFill>
+                  <a:schemeClr val="bg1"/>
+                </a:solidFill>
+              </a:rPr>
+              <a:t>diag_kind</a:t>
+            </a:r>
+            <a:r>
+              <a:rPr lang="en-US" sz="1600" dirty="0">
+                <a:solidFill>
+                  <a:schemeClr val="bg1"/>
+                </a:solidFill>
+              </a:rPr>
+              <a:t>='</a:t>
+            </a:r>
+            <a:r>
+              <a:rPr lang="en-US" sz="1600" dirty="0" err="1">
+                <a:solidFill>
+                  <a:schemeClr val="bg1"/>
+                </a:solidFill>
+              </a:rPr>
+              <a:t>hist</a:t>
+            </a:r>
+            <a:r>
+              <a:rPr lang="en-US" sz="1600" dirty="0">
+                <a:solidFill>
+                  <a:schemeClr val="bg1"/>
+                </a:solidFill>
+              </a:rPr>
+              <a:t>')</a:t>
+            </a:r>
+          </a:p>
+          <a:p>
+            <a:r>
+              <a:rPr lang="en-US" sz="1600" dirty="0" err="1">
+                <a:solidFill>
+                  <a:schemeClr val="bg1"/>
+                </a:solidFill>
+              </a:rPr>
+              <a:t>plt.savefig</a:t>
+            </a:r>
+            <a:r>
+              <a:rPr lang="en-US" sz="1600" dirty="0">
+                <a:solidFill>
+                  <a:schemeClr val="bg1"/>
+                </a:solidFill>
+              </a:rPr>
+              <a:t>('plots/</a:t>
+            </a:r>
+            <a:r>
+              <a:rPr lang="en-US" sz="1600" dirty="0" err="1">
+                <a:solidFill>
+                  <a:schemeClr val="bg1"/>
+                </a:solidFill>
+              </a:rPr>
+              <a:t>diabetes_pairplot.png</a:t>
+            </a:r>
+            <a:r>
+              <a:rPr lang="en-US" sz="1600" dirty="0">
+                <a:solidFill>
+                  <a:schemeClr val="bg1"/>
+                </a:solidFill>
+              </a:rPr>
+              <a:t>')</a:t>
+            </a:r>
+          </a:p>
+          <a:p>
+            <a:r>
+              <a:rPr lang="en-US" sz="1600" dirty="0" err="1">
+                <a:solidFill>
+                  <a:schemeClr val="bg1"/>
+                </a:solidFill>
+              </a:rPr>
+              <a:t>plt.clf</a:t>
+            </a:r>
+            <a:r>
+              <a:rPr lang="en-US" sz="1600" dirty="0">
+                <a:solidFill>
+                  <a:schemeClr val="bg1"/>
+                </a:solidFill>
+              </a:rPr>
+              <a:t>()</a:t>
+            </a:r>
+          </a:p>
+        </p:txBody>
+      </p:sp>
     </p:spTree>
     <p:extLst>
       <p:ext uri="{BB962C8B-B14F-4D97-AF65-F5344CB8AC3E}">

</xml_diff>